<commit_message>
Made some edits to COMP110 induction
</commit_message>
<xml_diff>
--- a/COMP110/01/induction.pptx
+++ b/COMP110/01/induction.pptx
@@ -267,7 +267,7 @@
           <a:p>
             <a:fld id="{79E534F8-EC88-491C-A843-F59F0165195D}" type="datetimeFigureOut">
               <a:rPr lang="en-GB" smtClean="0"/>
-              <a:t>04/09/2020</a:t>
+              <a:t>14/09/2021</a:t>
             </a:fld>
             <a:endParaRPr lang="en-GB"/>
           </a:p>
@@ -467,7 +467,7 @@
           <a:p>
             <a:fld id="{79E534F8-EC88-491C-A843-F59F0165195D}" type="datetimeFigureOut">
               <a:rPr lang="en-GB" smtClean="0"/>
-              <a:t>04/09/2020</a:t>
+              <a:t>14/09/2021</a:t>
             </a:fld>
             <a:endParaRPr lang="en-GB"/>
           </a:p>
@@ -677,7 +677,7 @@
           <a:p>
             <a:fld id="{79E534F8-EC88-491C-A843-F59F0165195D}" type="datetimeFigureOut">
               <a:rPr lang="en-GB" smtClean="0"/>
-              <a:t>04/09/2020</a:t>
+              <a:t>14/09/2021</a:t>
             </a:fld>
             <a:endParaRPr lang="en-GB"/>
           </a:p>
@@ -877,7 +877,7 @@
           <a:p>
             <a:fld id="{79E534F8-EC88-491C-A843-F59F0165195D}" type="datetimeFigureOut">
               <a:rPr lang="en-GB" smtClean="0"/>
-              <a:t>04/09/2020</a:t>
+              <a:t>14/09/2021</a:t>
             </a:fld>
             <a:endParaRPr lang="en-GB"/>
           </a:p>
@@ -1153,7 +1153,7 @@
           <a:p>
             <a:fld id="{79E534F8-EC88-491C-A843-F59F0165195D}" type="datetimeFigureOut">
               <a:rPr lang="en-GB" smtClean="0"/>
-              <a:t>04/09/2020</a:t>
+              <a:t>14/09/2021</a:t>
             </a:fld>
             <a:endParaRPr lang="en-GB"/>
           </a:p>
@@ -1421,7 +1421,7 @@
           <a:p>
             <a:fld id="{79E534F8-EC88-491C-A843-F59F0165195D}" type="datetimeFigureOut">
               <a:rPr lang="en-GB" smtClean="0"/>
-              <a:t>04/09/2020</a:t>
+              <a:t>14/09/2021</a:t>
             </a:fld>
             <a:endParaRPr lang="en-GB"/>
           </a:p>
@@ -1836,7 +1836,7 @@
           <a:p>
             <a:fld id="{79E534F8-EC88-491C-A843-F59F0165195D}" type="datetimeFigureOut">
               <a:rPr lang="en-GB" smtClean="0"/>
-              <a:t>04/09/2020</a:t>
+              <a:t>14/09/2021</a:t>
             </a:fld>
             <a:endParaRPr lang="en-GB"/>
           </a:p>
@@ -1978,7 +1978,7 @@
           <a:p>
             <a:fld id="{79E534F8-EC88-491C-A843-F59F0165195D}" type="datetimeFigureOut">
               <a:rPr lang="en-GB" smtClean="0"/>
-              <a:t>04/09/2020</a:t>
+              <a:t>14/09/2021</a:t>
             </a:fld>
             <a:endParaRPr lang="en-GB"/>
           </a:p>
@@ -2091,7 +2091,7 @@
           <a:p>
             <a:fld id="{79E534F8-EC88-491C-A843-F59F0165195D}" type="datetimeFigureOut">
               <a:rPr lang="en-GB" smtClean="0"/>
-              <a:t>04/09/2020</a:t>
+              <a:t>14/09/2021</a:t>
             </a:fld>
             <a:endParaRPr lang="en-GB"/>
           </a:p>
@@ -2404,7 +2404,7 @@
           <a:p>
             <a:fld id="{79E534F8-EC88-491C-A843-F59F0165195D}" type="datetimeFigureOut">
               <a:rPr lang="en-GB" smtClean="0"/>
-              <a:t>04/09/2020</a:t>
+              <a:t>14/09/2021</a:t>
             </a:fld>
             <a:endParaRPr lang="en-GB"/>
           </a:p>
@@ -2693,7 +2693,7 @@
           <a:p>
             <a:fld id="{79E534F8-EC88-491C-A843-F59F0165195D}" type="datetimeFigureOut">
               <a:rPr lang="en-GB" smtClean="0"/>
-              <a:t>04/09/2020</a:t>
+              <a:t>14/09/2021</a:t>
             </a:fld>
             <a:endParaRPr lang="en-GB"/>
           </a:p>
@@ -2936,7 +2936,7 @@
           <a:p>
             <a:fld id="{79E534F8-EC88-491C-A843-F59F0165195D}" type="datetimeFigureOut">
               <a:rPr lang="en-GB" smtClean="0"/>
-              <a:t>04/09/2020</a:t>
+              <a:t>14/09/2021</a:t>
             </a:fld>
             <a:endParaRPr lang="en-GB"/>
           </a:p>
@@ -3722,14 +3722,14 @@
             <a:pPr lvl="1"/>
             <a:r>
               <a:rPr lang="en-GB" dirty="0"/>
-              <a:t>BSc(Hons) Web Development</a:t>
+              <a:t>BSc(Hons) Robotics</a:t>
             </a:r>
           </a:p>
           <a:p>
             <a:pPr lvl="1"/>
             <a:r>
               <a:rPr lang="en-GB" dirty="0"/>
-              <a:t>BSc(Hons) Creative Robotics</a:t>
+              <a:t>BSc(Hons) Computer Science</a:t>
             </a:r>
           </a:p>
           <a:p>
@@ -3876,7 +3876,7 @@
           <p:nvPr>
             <p:extLst>
               <p:ext uri="{D42A27DB-BD31-4B8C-83A1-F6EECF244321}">
-                <p14:modId xmlns:p14="http://schemas.microsoft.com/office/powerpoint/2010/main" val="2862771061"/>
+                <p14:modId xmlns:p14="http://schemas.microsoft.com/office/powerpoint/2010/main" val="3030289957"/>
               </p:ext>
             </p:extLst>
           </p:nvPr>
@@ -5325,7 +5325,7 @@
           <a:p>
             <a:r>
               <a:rPr lang="en-GB" sz="1600" dirty="0"/>
-              <a:t>Traversal</a:t>
+              <a:t>Recursion</a:t>
             </a:r>
           </a:p>
         </p:txBody>
@@ -6658,7 +6658,7 @@
           <p:nvPr>
             <p:extLst>
               <p:ext uri="{D42A27DB-BD31-4B8C-83A1-F6EECF244321}">
-                <p14:modId xmlns:p14="http://schemas.microsoft.com/office/powerpoint/2010/main" val="2682554956"/>
+                <p14:modId xmlns:p14="http://schemas.microsoft.com/office/powerpoint/2010/main" val="3274005769"/>
               </p:ext>
             </p:extLst>
           </p:nvPr>
@@ -7339,7 +7339,7 @@
           <a:p>
             <a:r>
               <a:rPr lang="en-GB" sz="1600" dirty="0"/>
-              <a:t>Worksheet sign-off (1.5 hr)</a:t>
+              <a:t>Midterm review (1.5 hr)</a:t>
             </a:r>
           </a:p>
         </p:txBody>
@@ -7873,55 +7873,7 @@
           <a:p>
             <a:r>
               <a:rPr lang="en-GB" sz="1600" dirty="0"/>
-              <a:t>(4 hrs)</a:t>
-            </a:r>
-          </a:p>
-        </p:txBody>
-      </p:sp>
-      <p:sp>
-        <p:nvSpPr>
-          <p:cNvPr id="59" name="TextBox 58">
-            <a:extLst>
-              <a:ext uri="{FF2B5EF4-FFF2-40B4-BE49-F238E27FC236}">
-                <a16:creationId xmlns:a16="http://schemas.microsoft.com/office/drawing/2014/main" id="{D00914D5-C237-4A42-94A4-55E536DD90F0}"/>
-              </a:ext>
-            </a:extLst>
-          </p:cNvPr>
-          <p:cNvSpPr txBox="1"/>
-          <p:nvPr/>
-        </p:nvSpPr>
-        <p:spPr>
-          <a:xfrm>
-            <a:off x="2370813" y="2983064"/>
-            <a:ext cx="1773141" cy="338554"/>
-          </a:xfrm>
-          <a:prstGeom prst="rect">
-            <a:avLst/>
-          </a:prstGeom>
-        </p:spPr>
-        <p:style>
-          <a:lnRef idx="1">
-            <a:schemeClr val="accent6"/>
-          </a:lnRef>
-          <a:fillRef idx="3">
-            <a:schemeClr val="accent6"/>
-          </a:fillRef>
-          <a:effectRef idx="2">
-            <a:schemeClr val="accent6"/>
-          </a:effectRef>
-          <a:fontRef idx="minor">
-            <a:schemeClr val="lt1"/>
-          </a:fontRef>
-        </p:style>
-        <p:txBody>
-          <a:bodyPr wrap="square" rtlCol="0">
-            <a:spAutoFit/>
-          </a:bodyPr>
-          <a:lstStyle/>
-          <a:p>
-            <a:r>
-              <a:rPr lang="en-GB" sz="1600" dirty="0"/>
-              <a:t>Workshop (3 hrs)</a:t>
+              <a:t>(3 hrs)</a:t>
             </a:r>
           </a:p>
         </p:txBody>
@@ -8161,7 +8113,7 @@
           <a:p>
             <a:r>
               <a:rPr lang="en-GB" sz="1200" dirty="0"/>
-              <a:t>Worksheet support (1 hr)</a:t>
+              <a:t>Tutorial (1 hr)</a:t>
             </a:r>
           </a:p>
         </p:txBody>
@@ -8209,7 +8161,7 @@
           <a:p>
             <a:r>
               <a:rPr lang="en-GB" sz="1200" dirty="0"/>
-              <a:t>Worksheet support (1 hr)</a:t>
+              <a:t>Tutorial (1 hr)</a:t>
             </a:r>
           </a:p>
         </p:txBody>
@@ -8257,7 +8209,7 @@
           <a:p>
             <a:r>
               <a:rPr lang="en-GB" sz="1200" dirty="0"/>
-              <a:t>Worksheet support (1 hr)</a:t>
+              <a:t>Tutorial (1 hr)</a:t>
             </a:r>
           </a:p>
         </p:txBody>
@@ -8305,7 +8257,7 @@
           <a:p>
             <a:r>
               <a:rPr lang="en-GB" sz="1200" dirty="0"/>
-              <a:t>Worksheet support (1 hr)</a:t>
+              <a:t>Tutorial (1 hr)</a:t>
             </a:r>
           </a:p>
         </p:txBody>
@@ -8324,7 +8276,7 @@
         </p:nvSpPr>
         <p:spPr>
           <a:xfrm>
-            <a:off x="2370812" y="3394867"/>
+            <a:off x="2362875" y="3564539"/>
             <a:ext cx="1773141" cy="276999"/>
           </a:xfrm>
           <a:prstGeom prst="rect">
@@ -8353,7 +8305,7 @@
           <a:p>
             <a:r>
               <a:rPr lang="en-GB" sz="1200" dirty="0"/>
-              <a:t>Worksheet support (1 hr)</a:t>
+              <a:t>Tutorial (1 hr)</a:t>
             </a:r>
           </a:p>
         </p:txBody>
@@ -8372,7 +8324,7 @@
         </p:nvSpPr>
         <p:spPr>
           <a:xfrm>
-            <a:off x="4264547" y="3394867"/>
+            <a:off x="4264547" y="3564539"/>
             <a:ext cx="1773141" cy="276999"/>
           </a:xfrm>
           <a:prstGeom prst="rect">
@@ -8401,7 +8353,7 @@
           <a:p>
             <a:r>
               <a:rPr lang="en-GB" sz="1200" dirty="0"/>
-              <a:t>Worksheet support (1 hr)</a:t>
+              <a:t>Tutorial (1 hr)</a:t>
             </a:r>
           </a:p>
         </p:txBody>
@@ -8420,7 +8372,7 @@
         </p:nvSpPr>
         <p:spPr>
           <a:xfrm>
-            <a:off x="6154314" y="3397883"/>
+            <a:off x="6154314" y="3567555"/>
             <a:ext cx="1773141" cy="276999"/>
           </a:xfrm>
           <a:prstGeom prst="rect">
@@ -8449,7 +8401,7 @@
           <a:p>
             <a:r>
               <a:rPr lang="en-GB" sz="1200" dirty="0"/>
-              <a:t>Worksheet support (1 hr)</a:t>
+              <a:t>Tutorial (1 hr)</a:t>
             </a:r>
           </a:p>
         </p:txBody>
@@ -8468,7 +8420,7 @@
         </p:nvSpPr>
         <p:spPr>
           <a:xfrm>
-            <a:off x="8052018" y="3391821"/>
+            <a:off x="8052018" y="3561493"/>
             <a:ext cx="1773141" cy="276999"/>
           </a:xfrm>
           <a:prstGeom prst="rect">
@@ -8497,7 +8449,7 @@
           <a:p>
             <a:r>
               <a:rPr lang="en-GB" sz="1200" dirty="0"/>
-              <a:t>Worksheet support (1 hr)</a:t>
+              <a:t>Tutorial (1 hr)</a:t>
             </a:r>
           </a:p>
         </p:txBody>
@@ -8516,7 +8468,7 @@
         </p:nvSpPr>
         <p:spPr>
           <a:xfrm>
-            <a:off x="9937816" y="3391820"/>
+            <a:off x="9937816" y="3561492"/>
             <a:ext cx="1773141" cy="276999"/>
           </a:xfrm>
           <a:prstGeom prst="rect">
@@ -8545,7 +8497,7 @@
           <a:p>
             <a:r>
               <a:rPr lang="en-GB" sz="1200" dirty="0"/>
-              <a:t>Worksheet support (1 hr)</a:t>
+              <a:t>Tutorial (1 hr)</a:t>
             </a:r>
           </a:p>
         </p:txBody>
@@ -8593,7 +8545,7 @@
           <a:p>
             <a:r>
               <a:rPr lang="en-GB" sz="1600" dirty="0"/>
-              <a:t>Worksheet sign-off and </a:t>
+              <a:t>Worksheet </a:t>
             </a:r>
             <a:r>
               <a:rPr lang="en-GB" sz="1600" dirty="0" err="1"/>
@@ -8620,7 +8572,7 @@
         </p:nvSpPr>
         <p:spPr>
           <a:xfrm>
-            <a:off x="2370812" y="3745115"/>
+            <a:off x="2362876" y="2983064"/>
             <a:ext cx="1773141" cy="523220"/>
           </a:xfrm>
           <a:prstGeom prst="rect">
@@ -8649,7 +8601,103 @@
           <a:p>
             <a:r>
               <a:rPr lang="en-GB" sz="1400" dirty="0"/>
-              <a:t>Research journal peer review (1.5 hrs)</a:t>
+              <a:t>Research journal peer review (3 hrs)</a:t>
+            </a:r>
+          </a:p>
+        </p:txBody>
+      </p:sp>
+      <p:sp>
+        <p:nvSpPr>
+          <p:cNvPr id="36" name="TextBox 35">
+            <a:extLst>
+              <a:ext uri="{FF2B5EF4-FFF2-40B4-BE49-F238E27FC236}">
+                <a16:creationId xmlns:a16="http://schemas.microsoft.com/office/drawing/2014/main" id="{6B9D1C72-CB78-4F69-871A-27515DA243F5}"/>
+              </a:ext>
+            </a:extLst>
+          </p:cNvPr>
+          <p:cNvSpPr txBox="1"/>
+          <p:nvPr/>
+        </p:nvSpPr>
+        <p:spPr>
+          <a:xfrm>
+            <a:off x="473106" y="1248046"/>
+            <a:ext cx="1773141" cy="338554"/>
+          </a:xfrm>
+          <a:prstGeom prst="rect">
+            <a:avLst/>
+          </a:prstGeom>
+        </p:spPr>
+        <p:style>
+          <a:lnRef idx="1">
+            <a:schemeClr val="accent6"/>
+          </a:lnRef>
+          <a:fillRef idx="3">
+            <a:schemeClr val="accent6"/>
+          </a:fillRef>
+          <a:effectRef idx="2">
+            <a:schemeClr val="accent6"/>
+          </a:effectRef>
+          <a:fontRef idx="minor">
+            <a:schemeClr val="lt1"/>
+          </a:fontRef>
+        </p:style>
+        <p:txBody>
+          <a:bodyPr wrap="square" rtlCol="0">
+            <a:spAutoFit/>
+          </a:bodyPr>
+          <a:lstStyle/>
+          <a:p>
+            <a:r>
+              <a:rPr lang="en-GB" sz="1600" dirty="0"/>
+              <a:t>Workshop (2 hrs)</a:t>
+            </a:r>
+          </a:p>
+        </p:txBody>
+      </p:sp>
+      <p:sp>
+        <p:nvSpPr>
+          <p:cNvPr id="38" name="TextBox 37">
+            <a:extLst>
+              <a:ext uri="{FF2B5EF4-FFF2-40B4-BE49-F238E27FC236}">
+                <a16:creationId xmlns:a16="http://schemas.microsoft.com/office/drawing/2014/main" id="{5D5ABE87-E4FC-426D-A7A6-C40E1B312D3D}"/>
+              </a:ext>
+            </a:extLst>
+          </p:cNvPr>
+          <p:cNvSpPr txBox="1"/>
+          <p:nvPr/>
+        </p:nvSpPr>
+        <p:spPr>
+          <a:xfrm>
+            <a:off x="9937816" y="1658778"/>
+            <a:ext cx="1773141" cy="276999"/>
+          </a:xfrm>
+          <a:prstGeom prst="rect">
+            <a:avLst/>
+          </a:prstGeom>
+        </p:spPr>
+        <p:style>
+          <a:lnRef idx="1">
+            <a:schemeClr val="accent2"/>
+          </a:lnRef>
+          <a:fillRef idx="3">
+            <a:schemeClr val="accent2"/>
+          </a:fillRef>
+          <a:effectRef idx="2">
+            <a:schemeClr val="accent2"/>
+          </a:effectRef>
+          <a:fontRef idx="minor">
+            <a:schemeClr val="lt1"/>
+          </a:fontRef>
+        </p:style>
+        <p:txBody>
+          <a:bodyPr wrap="square" rtlCol="0">
+            <a:spAutoFit/>
+          </a:bodyPr>
+          <a:lstStyle/>
+          <a:p>
+            <a:r>
+              <a:rPr lang="en-GB" sz="1200" dirty="0"/>
+              <a:t>Tutorial (1 hr)</a:t>
             </a:r>
           </a:p>
         </p:txBody>
@@ -9121,7 +9169,7 @@
                                           </p:stCondLst>
                                         </p:cTn>
                                         <p:tgtEl>
-                                          <p:spTgt spid="59"/>
+                                          <p:spTgt spid="60"/>
                                         </p:tgtEl>
                                         <p:attrNameLst>
                                           <p:attrName>style.visibility</p:attrName>
@@ -9148,7 +9196,7 @@
                                           </p:stCondLst>
                                         </p:cTn>
                                         <p:tgtEl>
-                                          <p:spTgt spid="60"/>
+                                          <p:spTgt spid="61"/>
                                         </p:tgtEl>
                                         <p:attrNameLst>
                                           <p:attrName>style.visibility</p:attrName>
@@ -9175,7 +9223,7 @@
                                           </p:stCondLst>
                                         </p:cTn>
                                         <p:tgtEl>
-                                          <p:spTgt spid="61"/>
+                                          <p:spTgt spid="62"/>
                                         </p:tgtEl>
                                         <p:attrNameLst>
                                           <p:attrName>style.visibility</p:attrName>
@@ -9202,7 +9250,7 @@
                                           </p:stCondLst>
                                         </p:cTn>
                                         <p:tgtEl>
-                                          <p:spTgt spid="62"/>
+                                          <p:spTgt spid="63"/>
                                         </p:tgtEl>
                                         <p:attrNameLst>
                                           <p:attrName>style.visibility</p:attrName>
@@ -9229,7 +9277,7 @@
                                           </p:stCondLst>
                                         </p:cTn>
                                         <p:tgtEl>
-                                          <p:spTgt spid="63"/>
+                                          <p:spTgt spid="36"/>
                                         </p:tgtEl>
                                         <p:attrNameLst>
                                           <p:attrName>style.visibility</p:attrName>
@@ -9301,7 +9349,7 @@
                                           </p:stCondLst>
                                         </p:cTn>
                                         <p:tgtEl>
-                                          <p:spTgt spid="65"/>
+                                          <p:spTgt spid="38"/>
                                         </p:tgtEl>
                                         <p:attrNameLst>
                                           <p:attrName>style.visibility</p:attrName>
@@ -9328,7 +9376,7 @@
                                           </p:stCondLst>
                                         </p:cTn>
                                         <p:tgtEl>
-                                          <p:spTgt spid="66"/>
+                                          <p:spTgt spid="65"/>
                                         </p:tgtEl>
                                         <p:attrNameLst>
                                           <p:attrName>style.visibility</p:attrName>
@@ -9355,7 +9403,7 @@
                                           </p:stCondLst>
                                         </p:cTn>
                                         <p:tgtEl>
-                                          <p:spTgt spid="67"/>
+                                          <p:spTgt spid="66"/>
                                         </p:tgtEl>
                                         <p:attrNameLst>
                                           <p:attrName>style.visibility</p:attrName>
@@ -9382,7 +9430,7 @@
                                           </p:stCondLst>
                                         </p:cTn>
                                         <p:tgtEl>
-                                          <p:spTgt spid="68"/>
+                                          <p:spTgt spid="67"/>
                                         </p:tgtEl>
                                         <p:attrNameLst>
                                           <p:attrName>style.visibility</p:attrName>
@@ -9409,7 +9457,7 @@
                                           </p:stCondLst>
                                         </p:cTn>
                                         <p:tgtEl>
-                                          <p:spTgt spid="69"/>
+                                          <p:spTgt spid="68"/>
                                         </p:tgtEl>
                                         <p:attrNameLst>
                                           <p:attrName>style.visibility</p:attrName>
@@ -9436,7 +9484,7 @@
                                           </p:stCondLst>
                                         </p:cTn>
                                         <p:tgtEl>
-                                          <p:spTgt spid="70"/>
+                                          <p:spTgt spid="69"/>
                                         </p:tgtEl>
                                         <p:attrNameLst>
                                           <p:attrName>style.visibility</p:attrName>
@@ -9463,7 +9511,7 @@
                                           </p:stCondLst>
                                         </p:cTn>
                                         <p:tgtEl>
-                                          <p:spTgt spid="71"/>
+                                          <p:spTgt spid="70"/>
                                         </p:tgtEl>
                                         <p:attrNameLst>
                                           <p:attrName>style.visibility</p:attrName>
@@ -9490,6 +9538,33 @@
                                           </p:stCondLst>
                                         </p:cTn>
                                         <p:tgtEl>
+                                          <p:spTgt spid="71"/>
+                                        </p:tgtEl>
+                                        <p:attrNameLst>
+                                          <p:attrName>style.visibility</p:attrName>
+                                        </p:attrNameLst>
+                                      </p:cBhvr>
+                                      <p:to>
+                                        <p:strVal val="visible"/>
+                                      </p:to>
+                                    </p:set>
+                                  </p:childTnLst>
+                                </p:cTn>
+                              </p:par>
+                              <p:par>
+                                <p:cTn id="67" presetID="1" presetClass="entr" presetSubtype="0" fill="hold" grpId="0" nodeType="withEffect">
+                                  <p:stCondLst>
+                                    <p:cond delay="0"/>
+                                  </p:stCondLst>
+                                  <p:childTnLst>
+                                    <p:set>
+                                      <p:cBhvr>
+                                        <p:cTn id="68" dur="1" fill="hold">
+                                          <p:stCondLst>
+                                            <p:cond delay="0"/>
+                                          </p:stCondLst>
+                                        </p:cTn>
+                                        <p:tgtEl>
                                           <p:spTgt spid="72"/>
                                         </p:tgtEl>
                                         <p:attrNameLst>
@@ -9510,46 +9585,19 @@
                     </p:cTn>
                   </p:par>
                   <p:par>
-                    <p:cTn id="67" fill="hold">
+                    <p:cTn id="69" fill="hold">
                       <p:stCondLst>
                         <p:cond delay="indefinite"/>
                       </p:stCondLst>
                       <p:childTnLst>
                         <p:par>
-                          <p:cTn id="68" fill="hold">
+                          <p:cTn id="70" fill="hold">
                             <p:stCondLst>
                               <p:cond delay="0"/>
                             </p:stCondLst>
                             <p:childTnLst>
                               <p:par>
-                                <p:cTn id="69" presetID="1" presetClass="entr" presetSubtype="0" fill="hold" grpId="0" nodeType="clickEffect">
-                                  <p:stCondLst>
-                                    <p:cond delay="0"/>
-                                  </p:stCondLst>
-                                  <p:childTnLst>
-                                    <p:set>
-                                      <p:cBhvr>
-                                        <p:cTn id="70" dur="1" fill="hold">
-                                          <p:stCondLst>
-                                            <p:cond delay="0"/>
-                                          </p:stCondLst>
-                                        </p:cTn>
-                                        <p:tgtEl>
-                                          <p:spTgt spid="35"/>
-                                        </p:tgtEl>
-                                        <p:attrNameLst>
-                                          <p:attrName>style.visibility</p:attrName>
-                                        </p:attrNameLst>
-                                      </p:cBhvr>
-                                      <p:to>
-                                        <p:strVal val="visible"/>
-                                      </p:to>
-                                    </p:set>
-                                  </p:childTnLst>
-                                </p:cTn>
-                              </p:par>
-                              <p:par>
-                                <p:cTn id="71" presetID="1" presetClass="entr" presetSubtype="0" fill="hold" grpId="0" nodeType="withEffect">
+                                <p:cTn id="71" presetID="1" presetClass="entr" presetSubtype="0" fill="hold" grpId="0" nodeType="clickEffect">
                                   <p:stCondLst>
                                     <p:cond delay="0"/>
                                   </p:stCondLst>
@@ -9562,7 +9610,7 @@
                                           </p:stCondLst>
                                         </p:cTn>
                                         <p:tgtEl>
-                                          <p:spTgt spid="73"/>
+                                          <p:spTgt spid="35"/>
                                         </p:tgtEl>
                                         <p:attrNameLst>
                                           <p:attrName>style.visibility</p:attrName>
@@ -9671,6 +9719,51 @@
                       </p:childTnLst>
                     </p:cTn>
                   </p:par>
+                  <p:par>
+                    <p:cTn id="81" fill="hold">
+                      <p:stCondLst>
+                        <p:cond delay="indefinite"/>
+                      </p:stCondLst>
+                      <p:childTnLst>
+                        <p:par>
+                          <p:cTn id="82" fill="hold">
+                            <p:stCondLst>
+                              <p:cond delay="0"/>
+                            </p:stCondLst>
+                            <p:childTnLst>
+                              <p:par>
+                                <p:cTn id="83" presetID="1" presetClass="entr" presetSubtype="0" fill="hold" grpId="0" nodeType="clickEffect">
+                                  <p:stCondLst>
+                                    <p:cond delay="0"/>
+                                  </p:stCondLst>
+                                  <p:childTnLst>
+                                    <p:set>
+                                      <p:cBhvr>
+                                        <p:cTn id="84" dur="1" fill="hold">
+                                          <p:stCondLst>
+                                            <p:cond delay="0"/>
+                                          </p:stCondLst>
+                                        </p:cTn>
+                                        <p:tgtEl>
+                                          <p:spTgt spid="73"/>
+                                        </p:tgtEl>
+                                        <p:attrNameLst>
+                                          <p:attrName>style.visibility</p:attrName>
+                                        </p:attrNameLst>
+                                      </p:cBhvr>
+                                      <p:to>
+                                        <p:strVal val="visible"/>
+                                      </p:to>
+                                    </p:set>
+                                  </p:childTnLst>
+                                </p:cTn>
+                              </p:par>
+                            </p:childTnLst>
+                          </p:cTn>
+                        </p:par>
+                      </p:childTnLst>
+                    </p:cTn>
+                  </p:par>
                 </p:childTnLst>
               </p:cTn>
               <p:prevCondLst>
@@ -9710,7 +9803,6 @@
       <p:bldP spid="53" grpId="0" animBg="1"/>
       <p:bldP spid="55" grpId="0" animBg="1"/>
       <p:bldP spid="58" grpId="0" animBg="1"/>
-      <p:bldP spid="59" grpId="0" animBg="1"/>
       <p:bldP spid="60" grpId="0" animBg="1"/>
       <p:bldP spid="61" grpId="0" animBg="1"/>
       <p:bldP spid="62" grpId="0" animBg="1"/>
@@ -9726,6 +9818,8 @@
       <p:bldP spid="72" grpId="0" animBg="1"/>
       <p:bldP spid="73" grpId="0" animBg="1"/>
       <p:bldP spid="76" grpId="0" animBg="1"/>
+      <p:bldP spid="36" grpId="0" animBg="1"/>
+      <p:bldP spid="38" grpId="0" animBg="1"/>
     </p:bldLst>
   </p:timing>
 </p:sld>

</xml_diff>